<commit_message>
added the description of the FB results
</commit_message>
<xml_diff>
--- a/Manuscript/Figures/05_RESULTS_VRTs.pptx
+++ b/Manuscript/Figures/05_RESULTS_VRTs.pptx
@@ -125,7 +125,7 @@
   <pc:docChgLst>
     <pc:chgData name="Fatima Pillosu" userId="a6295d4dc9e22643" providerId="LiveId" clId="{2A9B2BDC-83AC-40F6-B019-2565973FE23A}"/>
     <pc:docChg chg="undo redo custSel addSld delSld modSld">
-      <pc:chgData name="Fatima Pillosu" userId="a6295d4dc9e22643" providerId="LiveId" clId="{2A9B2BDC-83AC-40F6-B019-2565973FE23A}" dt="2023-11-13T16:13:33.347" v="3574"/>
+      <pc:chgData name="Fatima Pillosu" userId="a6295d4dc9e22643" providerId="LiveId" clId="{2A9B2BDC-83AC-40F6-B019-2565973FE23A}" dt="2023-11-17T17:22:43.823" v="3584" actId="208"/>
       <pc:docMkLst>
         <pc:docMk/>
       </pc:docMkLst>
@@ -2151,7 +2151,7 @@
         </pc:cxnChg>
       </pc:sldChg>
       <pc:sldChg chg="addSp delSp modSp new mod">
-        <pc:chgData name="Fatima Pillosu" userId="a6295d4dc9e22643" providerId="LiveId" clId="{2A9B2BDC-83AC-40F6-B019-2565973FE23A}" dt="2023-11-13T16:13:33.347" v="3574"/>
+        <pc:chgData name="Fatima Pillosu" userId="a6295d4dc9e22643" providerId="LiveId" clId="{2A9B2BDC-83AC-40F6-B019-2565973FE23A}" dt="2023-11-17T17:22:43.823" v="3584" actId="208"/>
         <pc:sldMkLst>
           <pc:docMk/>
           <pc:sldMk cId="2456034706" sldId="261"/>
@@ -2869,7 +2869,7 @@
           </ac:spMkLst>
         </pc:spChg>
         <pc:spChg chg="add mod">
-          <ac:chgData name="Fatima Pillosu" userId="a6295d4dc9e22643" providerId="LiveId" clId="{2A9B2BDC-83AC-40F6-B019-2565973FE23A}" dt="2023-11-13T16:13:33.347" v="3574"/>
+          <ac:chgData name="Fatima Pillosu" userId="a6295d4dc9e22643" providerId="LiveId" clId="{2A9B2BDC-83AC-40F6-B019-2565973FE23A}" dt="2023-11-17T17:22:43.823" v="3584" actId="208"/>
           <ac:spMkLst>
             <pc:docMk/>
             <pc:sldMk cId="2456034706" sldId="261"/>
@@ -2877,15 +2877,15 @@
           </ac:spMkLst>
         </pc:spChg>
         <pc:spChg chg="add mod">
-          <ac:chgData name="Fatima Pillosu" userId="a6295d4dc9e22643" providerId="LiveId" clId="{2A9B2BDC-83AC-40F6-B019-2565973FE23A}" dt="2023-11-13T16:13:33.347" v="3574"/>
+          <ac:chgData name="Fatima Pillosu" userId="a6295d4dc9e22643" providerId="LiveId" clId="{2A9B2BDC-83AC-40F6-B019-2565973FE23A}" dt="2023-11-17T17:22:43.823" v="3584" actId="208"/>
           <ac:spMkLst>
             <pc:docMk/>
             <pc:sldMk cId="2456034706" sldId="261"/>
             <ac:spMk id="148" creationId="{600F823E-FD62-C872-3BBC-2B200EA0531C}"/>
           </ac:spMkLst>
         </pc:spChg>
-        <pc:spChg chg="add mod">
-          <ac:chgData name="Fatima Pillosu" userId="a6295d4dc9e22643" providerId="LiveId" clId="{2A9B2BDC-83AC-40F6-B019-2565973FE23A}" dt="2023-11-13T16:13:33.347" v="3574"/>
+        <pc:spChg chg="add del mod">
+          <ac:chgData name="Fatima Pillosu" userId="a6295d4dc9e22643" providerId="LiveId" clId="{2A9B2BDC-83AC-40F6-B019-2565973FE23A}" dt="2023-11-17T17:21:14.536" v="3576" actId="478"/>
           <ac:spMkLst>
             <pc:docMk/>
             <pc:sldMk cId="2456034706" sldId="261"/>
@@ -2901,7 +2901,7 @@
           </ac:spMkLst>
         </pc:spChg>
         <pc:spChg chg="add mod">
-          <ac:chgData name="Fatima Pillosu" userId="a6295d4dc9e22643" providerId="LiveId" clId="{2A9B2BDC-83AC-40F6-B019-2565973FE23A}" dt="2023-11-13T16:13:33.347" v="3574"/>
+          <ac:chgData name="Fatima Pillosu" userId="a6295d4dc9e22643" providerId="LiveId" clId="{2A9B2BDC-83AC-40F6-B019-2565973FE23A}" dt="2023-11-17T17:21:21.798" v="3579" actId="20577"/>
           <ac:spMkLst>
             <pc:docMk/>
             <pc:sldMk cId="2456034706" sldId="261"/>
@@ -2909,7 +2909,7 @@
           </ac:spMkLst>
         </pc:spChg>
         <pc:spChg chg="add mod">
-          <ac:chgData name="Fatima Pillosu" userId="a6295d4dc9e22643" providerId="LiveId" clId="{2A9B2BDC-83AC-40F6-B019-2565973FE23A}" dt="2023-11-13T16:13:33.347" v="3574"/>
+          <ac:chgData name="Fatima Pillosu" userId="a6295d4dc9e22643" providerId="LiveId" clId="{2A9B2BDC-83AC-40F6-B019-2565973FE23A}" dt="2023-11-17T17:21:26.311" v="3583" actId="20577"/>
           <ac:spMkLst>
             <pc:docMk/>
             <pc:sldMk cId="2456034706" sldId="261"/>
@@ -2917,7 +2917,7 @@
           </ac:spMkLst>
         </pc:spChg>
         <pc:spChg chg="add mod">
-          <ac:chgData name="Fatima Pillosu" userId="a6295d4dc9e22643" providerId="LiveId" clId="{2A9B2BDC-83AC-40F6-B019-2565973FE23A}" dt="2023-11-13T16:13:33.347" v="3574"/>
+          <ac:chgData name="Fatima Pillosu" userId="a6295d4dc9e22643" providerId="LiveId" clId="{2A9B2BDC-83AC-40F6-B019-2565973FE23A}" dt="2023-11-17T17:22:43.823" v="3584" actId="208"/>
           <ac:spMkLst>
             <pc:docMk/>
             <pc:sldMk cId="2456034706" sldId="261"/>
@@ -2925,15 +2925,15 @@
           </ac:spMkLst>
         </pc:spChg>
         <pc:spChg chg="add mod">
-          <ac:chgData name="Fatima Pillosu" userId="a6295d4dc9e22643" providerId="LiveId" clId="{2A9B2BDC-83AC-40F6-B019-2565973FE23A}" dt="2023-11-13T16:13:33.347" v="3574"/>
+          <ac:chgData name="Fatima Pillosu" userId="a6295d4dc9e22643" providerId="LiveId" clId="{2A9B2BDC-83AC-40F6-B019-2565973FE23A}" dt="2023-11-17T17:22:43.823" v="3584" actId="208"/>
           <ac:spMkLst>
             <pc:docMk/>
             <pc:sldMk cId="2456034706" sldId="261"/>
             <ac:spMk id="156" creationId="{293D665F-A7EB-5310-8C48-7612D828D1CB}"/>
           </ac:spMkLst>
         </pc:spChg>
-        <pc:spChg chg="add mod">
-          <ac:chgData name="Fatima Pillosu" userId="a6295d4dc9e22643" providerId="LiveId" clId="{2A9B2BDC-83AC-40F6-B019-2565973FE23A}" dt="2023-11-13T16:13:33.347" v="3574"/>
+        <pc:spChg chg="add del mod">
+          <ac:chgData name="Fatima Pillosu" userId="a6295d4dc9e22643" providerId="LiveId" clId="{2A9B2BDC-83AC-40F6-B019-2565973FE23A}" dt="2023-11-17T17:21:13.434" v="3575" actId="478"/>
           <ac:spMkLst>
             <pc:docMk/>
             <pc:sldMk cId="2456034706" sldId="261"/>
@@ -2957,7 +2957,7 @@
           </ac:spMkLst>
         </pc:spChg>
         <pc:spChg chg="add mod">
-          <ac:chgData name="Fatima Pillosu" userId="a6295d4dc9e22643" providerId="LiveId" clId="{2A9B2BDC-83AC-40F6-B019-2565973FE23A}" dt="2023-11-13T16:13:33.347" v="3574"/>
+          <ac:chgData name="Fatima Pillosu" userId="a6295d4dc9e22643" providerId="LiveId" clId="{2A9B2BDC-83AC-40F6-B019-2565973FE23A}" dt="2023-11-17T17:21:18.732" v="3578" actId="20577"/>
           <ac:spMkLst>
             <pc:docMk/>
             <pc:sldMk cId="2456034706" sldId="261"/>
@@ -3749,7 +3749,7 @@
           </ac:cxnSpMkLst>
         </pc:cxnChg>
         <pc:cxnChg chg="add mod">
-          <ac:chgData name="Fatima Pillosu" userId="a6295d4dc9e22643" providerId="LiveId" clId="{2A9B2BDC-83AC-40F6-B019-2565973FE23A}" dt="2023-11-13T16:13:33.347" v="3574"/>
+          <ac:chgData name="Fatima Pillosu" userId="a6295d4dc9e22643" providerId="LiveId" clId="{2A9B2BDC-83AC-40F6-B019-2565973FE23A}" dt="2023-11-17T17:22:43.823" v="3584" actId="208"/>
           <ac:cxnSpMkLst>
             <pc:docMk/>
             <pc:sldMk cId="2456034706" sldId="261"/>
@@ -3757,7 +3757,7 @@
           </ac:cxnSpMkLst>
         </pc:cxnChg>
         <pc:cxnChg chg="add mod">
-          <ac:chgData name="Fatima Pillosu" userId="a6295d4dc9e22643" providerId="LiveId" clId="{2A9B2BDC-83AC-40F6-B019-2565973FE23A}" dt="2023-11-13T16:13:33.347" v="3574"/>
+          <ac:chgData name="Fatima Pillosu" userId="a6295d4dc9e22643" providerId="LiveId" clId="{2A9B2BDC-83AC-40F6-B019-2565973FE23A}" dt="2023-11-17T17:22:43.823" v="3584" actId="208"/>
           <ac:cxnSpMkLst>
             <pc:docMk/>
             <pc:sldMk cId="2456034706" sldId="261"/>
@@ -3765,7 +3765,7 @@
           </ac:cxnSpMkLst>
         </pc:cxnChg>
         <pc:cxnChg chg="add mod">
-          <ac:chgData name="Fatima Pillosu" userId="a6295d4dc9e22643" providerId="LiveId" clId="{2A9B2BDC-83AC-40F6-B019-2565973FE23A}" dt="2023-11-13T16:13:33.347" v="3574"/>
+          <ac:chgData name="Fatima Pillosu" userId="a6295d4dc9e22643" providerId="LiveId" clId="{2A9B2BDC-83AC-40F6-B019-2565973FE23A}" dt="2023-11-17T17:22:43.823" v="3584" actId="208"/>
           <ac:cxnSpMkLst>
             <pc:docMk/>
             <pc:sldMk cId="2456034706" sldId="261"/>
@@ -3773,7 +3773,7 @@
           </ac:cxnSpMkLst>
         </pc:cxnChg>
         <pc:cxnChg chg="add mod">
-          <ac:chgData name="Fatima Pillosu" userId="a6295d4dc9e22643" providerId="LiveId" clId="{2A9B2BDC-83AC-40F6-B019-2565973FE23A}" dt="2023-11-13T16:13:33.347" v="3574"/>
+          <ac:chgData name="Fatima Pillosu" userId="a6295d4dc9e22643" providerId="LiveId" clId="{2A9B2BDC-83AC-40F6-B019-2565973FE23A}" dt="2023-11-17T17:22:43.823" v="3584" actId="208"/>
           <ac:cxnSpMkLst>
             <pc:docMk/>
             <pc:sldMk cId="2456034706" sldId="261"/>
@@ -16086,7 +16086,7 @@
           <a:p>
             <a:fld id="{B80D15F6-78EE-4630-AC5E-09BE10AE3EAA}" type="datetimeFigureOut">
               <a:rPr lang="en-GB" smtClean="0"/>
-              <a:t>13/11/2023</a:t>
+              <a:t>17/11/2023</a:t>
             </a:fld>
             <a:endParaRPr lang="en-GB"/>
           </a:p>
@@ -16256,7 +16256,7 @@
           <a:p>
             <a:fld id="{B80D15F6-78EE-4630-AC5E-09BE10AE3EAA}" type="datetimeFigureOut">
               <a:rPr lang="en-GB" smtClean="0"/>
-              <a:t>13/11/2023</a:t>
+              <a:t>17/11/2023</a:t>
             </a:fld>
             <a:endParaRPr lang="en-GB"/>
           </a:p>
@@ -16436,7 +16436,7 @@
           <a:p>
             <a:fld id="{B80D15F6-78EE-4630-AC5E-09BE10AE3EAA}" type="datetimeFigureOut">
               <a:rPr lang="en-GB" smtClean="0"/>
-              <a:t>13/11/2023</a:t>
+              <a:t>17/11/2023</a:t>
             </a:fld>
             <a:endParaRPr lang="en-GB"/>
           </a:p>
@@ -16606,7 +16606,7 @@
           <a:p>
             <a:fld id="{B80D15F6-78EE-4630-AC5E-09BE10AE3EAA}" type="datetimeFigureOut">
               <a:rPr lang="en-GB" smtClean="0"/>
-              <a:t>13/11/2023</a:t>
+              <a:t>17/11/2023</a:t>
             </a:fld>
             <a:endParaRPr lang="en-GB"/>
           </a:p>
@@ -16850,7 +16850,7 @@
           <a:p>
             <a:fld id="{B80D15F6-78EE-4630-AC5E-09BE10AE3EAA}" type="datetimeFigureOut">
               <a:rPr lang="en-GB" smtClean="0"/>
-              <a:t>13/11/2023</a:t>
+              <a:t>17/11/2023</a:t>
             </a:fld>
             <a:endParaRPr lang="en-GB"/>
           </a:p>
@@ -17082,7 +17082,7 @@
           <a:p>
             <a:fld id="{B80D15F6-78EE-4630-AC5E-09BE10AE3EAA}" type="datetimeFigureOut">
               <a:rPr lang="en-GB" smtClean="0"/>
-              <a:t>13/11/2023</a:t>
+              <a:t>17/11/2023</a:t>
             </a:fld>
             <a:endParaRPr lang="en-GB"/>
           </a:p>
@@ -17449,7 +17449,7 @@
           <a:p>
             <a:fld id="{B80D15F6-78EE-4630-AC5E-09BE10AE3EAA}" type="datetimeFigureOut">
               <a:rPr lang="en-GB" smtClean="0"/>
-              <a:t>13/11/2023</a:t>
+              <a:t>17/11/2023</a:t>
             </a:fld>
             <a:endParaRPr lang="en-GB"/>
           </a:p>
@@ -17567,7 +17567,7 @@
           <a:p>
             <a:fld id="{B80D15F6-78EE-4630-AC5E-09BE10AE3EAA}" type="datetimeFigureOut">
               <a:rPr lang="en-GB" smtClean="0"/>
-              <a:t>13/11/2023</a:t>
+              <a:t>17/11/2023</a:t>
             </a:fld>
             <a:endParaRPr lang="en-GB"/>
           </a:p>
@@ -17662,7 +17662,7 @@
           <a:p>
             <a:fld id="{B80D15F6-78EE-4630-AC5E-09BE10AE3EAA}" type="datetimeFigureOut">
               <a:rPr lang="en-GB" smtClean="0"/>
-              <a:t>13/11/2023</a:t>
+              <a:t>17/11/2023</a:t>
             </a:fld>
             <a:endParaRPr lang="en-GB"/>
           </a:p>
@@ -17939,7 +17939,7 @@
           <a:p>
             <a:fld id="{B80D15F6-78EE-4630-AC5E-09BE10AE3EAA}" type="datetimeFigureOut">
               <a:rPr lang="en-GB" smtClean="0"/>
-              <a:t>13/11/2023</a:t>
+              <a:t>17/11/2023</a:t>
             </a:fld>
             <a:endParaRPr lang="en-GB"/>
           </a:p>
@@ -18196,7 +18196,7 @@
           <a:p>
             <a:fld id="{B80D15F6-78EE-4630-AC5E-09BE10AE3EAA}" type="datetimeFigureOut">
               <a:rPr lang="en-GB" smtClean="0"/>
-              <a:t>13/11/2023</a:t>
+              <a:t>17/11/2023</a:t>
             </a:fld>
             <a:endParaRPr lang="en-GB"/>
           </a:p>
@@ -18409,7 +18409,7 @@
           <a:p>
             <a:fld id="{B80D15F6-78EE-4630-AC5E-09BE10AE3EAA}" type="datetimeFigureOut">
               <a:rPr lang="en-GB" smtClean="0"/>
-              <a:t>13/11/2023</a:t>
+              <a:t>17/11/2023</a:t>
             </a:fld>
             <a:endParaRPr lang="en-GB"/>
           </a:p>
@@ -20080,7 +20080,7 @@
           <a:ln w="3175">
             <a:solidFill>
               <a:schemeClr val="bg2">
-                <a:lumMod val="75000"/>
+                <a:lumMod val="50000"/>
               </a:schemeClr>
             </a:solidFill>
           </a:ln>
@@ -20125,7 +20125,7 @@
           <a:ln w="3175">
             <a:solidFill>
               <a:schemeClr val="bg2">
-                <a:lumMod val="75000"/>
+                <a:lumMod val="50000"/>
               </a:schemeClr>
             </a:solidFill>
           </a:ln>
@@ -20169,7 +20169,7 @@
           <a:ln w="3175">
             <a:solidFill>
               <a:schemeClr val="bg2">
-                <a:lumMod val="75000"/>
+                <a:lumMod val="50000"/>
               </a:schemeClr>
             </a:solidFill>
           </a:ln>
@@ -20223,7 +20223,7 @@
           <a:ln w="3175">
             <a:solidFill>
               <a:schemeClr val="bg2">
-                <a:lumMod val="75000"/>
+                <a:lumMod val="50000"/>
               </a:schemeClr>
             </a:solidFill>
           </a:ln>
@@ -20250,49 +20250,6 @@
           <a:p>
             <a:pPr algn="ctr"/>
             <a:endParaRPr lang="en-GB"/>
-          </a:p>
-        </p:txBody>
-      </p:sp>
-      <p:sp>
-        <p:nvSpPr>
-          <p:cNvPr id="149" name="TextBox 105">
-            <a:extLst>
-              <a:ext uri="{FF2B5EF4-FFF2-40B4-BE49-F238E27FC236}">
-                <a16:creationId xmlns:a16="http://schemas.microsoft.com/office/drawing/2014/main" id="{6B7F4FA5-819A-4E60-3F07-2746C8209F35}"/>
-              </a:ext>
-            </a:extLst>
-          </p:cNvPr>
-          <p:cNvSpPr txBox="1"/>
-          <p:nvPr/>
-        </p:nvSpPr>
-        <p:spPr>
-          <a:xfrm>
-            <a:off x="2587188" y="4549699"/>
-            <a:ext cx="234000" cy="215444"/>
-          </a:xfrm>
-          <a:prstGeom prst="rect">
-            <a:avLst/>
-          </a:prstGeom>
-          <a:solidFill>
-            <a:schemeClr val="bg1"/>
-          </a:solidFill>
-          <a:ln w="3175">
-            <a:solidFill>
-              <a:schemeClr val="tx1"/>
-            </a:solidFill>
-          </a:ln>
-        </p:spPr>
-        <p:txBody>
-          <a:bodyPr wrap="square" rtlCol="0">
-            <a:spAutoFit/>
-          </a:bodyPr>
-          <a:lstStyle/>
-          <a:p>
-            <a:r>
-              <a:rPr lang="it-IT" sz="800" dirty="0"/>
-              <a:t>e</a:t>
-            </a:r>
-            <a:endParaRPr lang="en-GB" sz="800" dirty="0"/>
           </a:p>
         </p:txBody>
       </p:sp>
@@ -20379,7 +20336,7 @@
           <a:p>
             <a:r>
               <a:rPr lang="it-IT" sz="800" dirty="0"/>
-              <a:t>d</a:t>
+              <a:t>c</a:t>
             </a:r>
             <a:endParaRPr lang="en-GB" sz="800" dirty="0"/>
           </a:p>
@@ -20422,7 +20379,7 @@
           <a:p>
             <a:r>
               <a:rPr lang="it-IT" sz="800" dirty="0"/>
-              <a:t>f</a:t>
+              <a:t>d</a:t>
             </a:r>
             <a:endParaRPr lang="en-GB" sz="800" dirty="0"/>
           </a:p>
@@ -20453,7 +20410,7 @@
           <a:ln w="3175">
             <a:solidFill>
               <a:schemeClr val="bg2">
-                <a:lumMod val="75000"/>
+                <a:lumMod val="50000"/>
               </a:schemeClr>
             </a:solidFill>
           </a:ln>
@@ -20498,7 +20455,7 @@
           <a:ln w="3175">
             <a:solidFill>
               <a:schemeClr val="bg2">
-                <a:lumMod val="75000"/>
+                <a:lumMod val="50000"/>
               </a:schemeClr>
             </a:solidFill>
           </a:ln>
@@ -20542,7 +20499,7 @@
           <a:ln w="3175">
             <a:solidFill>
               <a:schemeClr val="bg2">
-                <a:lumMod val="75000"/>
+                <a:lumMod val="50000"/>
               </a:schemeClr>
             </a:solidFill>
           </a:ln>
@@ -20596,7 +20553,7 @@
           <a:ln w="3175">
             <a:solidFill>
               <a:schemeClr val="bg2">
-                <a:lumMod val="75000"/>
+                <a:lumMod val="50000"/>
               </a:schemeClr>
             </a:solidFill>
           </a:ln>
@@ -20623,49 +20580,6 @@
           <a:p>
             <a:pPr algn="ctr"/>
             <a:endParaRPr lang="en-GB"/>
-          </a:p>
-        </p:txBody>
-      </p:sp>
-      <p:sp>
-        <p:nvSpPr>
-          <p:cNvPr id="157" name="TextBox 105">
-            <a:extLst>
-              <a:ext uri="{FF2B5EF4-FFF2-40B4-BE49-F238E27FC236}">
-                <a16:creationId xmlns:a16="http://schemas.microsoft.com/office/drawing/2014/main" id="{BD612A62-F761-5369-BDFF-208A631A5005}"/>
-              </a:ext>
-            </a:extLst>
-          </p:cNvPr>
-          <p:cNvSpPr txBox="1"/>
-          <p:nvPr/>
-        </p:nvSpPr>
-        <p:spPr>
-          <a:xfrm>
-            <a:off x="2587188" y="1742296"/>
-            <a:ext cx="234000" cy="215444"/>
-          </a:xfrm>
-          <a:prstGeom prst="rect">
-            <a:avLst/>
-          </a:prstGeom>
-          <a:solidFill>
-            <a:schemeClr val="bg1"/>
-          </a:solidFill>
-          <a:ln w="3175">
-            <a:solidFill>
-              <a:schemeClr val="tx1"/>
-            </a:solidFill>
-          </a:ln>
-        </p:spPr>
-        <p:txBody>
-          <a:bodyPr wrap="square" rtlCol="0">
-            <a:spAutoFit/>
-          </a:bodyPr>
-          <a:lstStyle/>
-          <a:p>
-            <a:r>
-              <a:rPr lang="it-IT" sz="800" dirty="0"/>
-              <a:t>b</a:t>
-            </a:r>
-            <a:endParaRPr lang="en-GB" sz="800" dirty="0"/>
           </a:p>
         </p:txBody>
       </p:sp>
@@ -20795,7 +20709,7 @@
           <a:p>
             <a:r>
               <a:rPr lang="it-IT" sz="800" dirty="0"/>
-              <a:t>c</a:t>
+              <a:t>b</a:t>
             </a:r>
             <a:endParaRPr lang="en-GB" sz="800" dirty="0"/>
           </a:p>

</xml_diff>